<commit_message>
Added debug apk, ppt and report pdf
</commit_message>
<xml_diff>
--- a/Report Files/RF Survey Toolkit.pptx
+++ b/Report Files/RF Survey Toolkit.pptx
@@ -5,17 +5,18 @@
     <p:sldMasterId id="2147483648" r:id="rId1"/>
   </p:sldMasterIdLst>
   <p:notesMasterIdLst>
-    <p:notesMasterId r:id="rId10"/>
+    <p:notesMasterId r:id="rId11"/>
   </p:notesMasterIdLst>
   <p:sldIdLst>
     <p:sldId id="256" r:id="rId2"/>
     <p:sldId id="344" r:id="rId3"/>
     <p:sldId id="316" r:id="rId4"/>
     <p:sldId id="342" r:id="rId5"/>
-    <p:sldId id="343" r:id="rId6"/>
-    <p:sldId id="317" r:id="rId7"/>
-    <p:sldId id="345" r:id="rId8"/>
-    <p:sldId id="280" r:id="rId9"/>
+    <p:sldId id="346" r:id="rId6"/>
+    <p:sldId id="343" r:id="rId7"/>
+    <p:sldId id="317" r:id="rId8"/>
+    <p:sldId id="345" r:id="rId9"/>
+    <p:sldId id="280" r:id="rId10"/>
   </p:sldIdLst>
   <p:sldSz cx="9144000" cy="6858000" type="screen4x3"/>
   <p:notesSz cx="6858000" cy="9144000"/>
@@ -823,7 +824,7 @@
     </p:spTree>
     <p:extLst>
       <p:ext uri="{BB962C8B-B14F-4D97-AF65-F5344CB8AC3E}">
-        <p14:creationId xmlns:p14="http://schemas.microsoft.com/office/powerpoint/2010/main" val="3095736521"/>
+        <p14:creationId xmlns:p14="http://schemas.microsoft.com/office/powerpoint/2010/main" val="2858852902"/>
       </p:ext>
     </p:extLst>
   </p:cSld>
@@ -907,7 +908,7 @@
     </p:spTree>
     <p:extLst>
       <p:ext uri="{BB962C8B-B14F-4D97-AF65-F5344CB8AC3E}">
-        <p14:creationId xmlns:p14="http://schemas.microsoft.com/office/powerpoint/2010/main" val="3012594192"/>
+        <p14:creationId xmlns:p14="http://schemas.microsoft.com/office/powerpoint/2010/main" val="3095736521"/>
       </p:ext>
     </p:extLst>
   </p:cSld>
@@ -983,6 +984,90 @@
             <a:fld id="{2A99E7CB-B55B-433F-ACF3-9EACF2CD01B5}" type="slidenum">
               <a:rPr lang="nl-NL" smtClean="0"/>
               <a:t>7</a:t>
+            </a:fld>
+            <a:endParaRPr lang="nl-NL"/>
+          </a:p>
+        </p:txBody>
+      </p:sp>
+    </p:spTree>
+    <p:extLst>
+      <p:ext uri="{BB962C8B-B14F-4D97-AF65-F5344CB8AC3E}">
+        <p14:creationId xmlns:p14="http://schemas.microsoft.com/office/powerpoint/2010/main" val="3012594192"/>
+      </p:ext>
+    </p:extLst>
+  </p:cSld>
+  <p:clrMapOvr>
+    <a:masterClrMapping/>
+  </p:clrMapOvr>
+</p:notes>
+</file>
+
+<file path=ppt/notesSlides/notesSlide7.xml><?xml version="1.0" encoding="utf-8"?>
+<p:notes xmlns:a="http://schemas.openxmlformats.org/drawingml/2006/main" xmlns:r="http://schemas.openxmlformats.org/officeDocument/2006/relationships" xmlns:p="http://schemas.openxmlformats.org/presentationml/2006/main">
+  <p:cSld>
+    <p:spTree>
+      <p:nvGrpSpPr>
+        <p:cNvPr id="1" name=""/>
+        <p:cNvGrpSpPr/>
+        <p:nvPr/>
+      </p:nvGrpSpPr>
+      <p:grpSpPr>
+        <a:xfrm>
+          <a:off x="0" y="0"/>
+          <a:ext cx="0" cy="0"/>
+          <a:chOff x="0" y="0"/>
+          <a:chExt cx="0" cy="0"/>
+        </a:xfrm>
+      </p:grpSpPr>
+      <p:sp>
+        <p:nvSpPr>
+          <p:cNvPr id="2" name="Slide Image Placeholder 1"/>
+          <p:cNvSpPr>
+            <a:spLocks noGrp="1" noRot="1" noChangeAspect="1"/>
+          </p:cNvSpPr>
+          <p:nvPr>
+            <p:ph type="sldImg"/>
+          </p:nvPr>
+        </p:nvSpPr>
+        <p:spPr/>
+      </p:sp>
+      <p:sp>
+        <p:nvSpPr>
+          <p:cNvPr id="3" name="Notes Placeholder 2"/>
+          <p:cNvSpPr>
+            <a:spLocks noGrp="1"/>
+          </p:cNvSpPr>
+          <p:nvPr>
+            <p:ph type="body" idx="1"/>
+          </p:nvPr>
+        </p:nvSpPr>
+        <p:spPr/>
+        <p:txBody>
+          <a:bodyPr/>
+          <a:lstStyle/>
+          <a:p>
+            <a:endParaRPr lang="nl-BE" dirty="0"/>
+          </a:p>
+        </p:txBody>
+      </p:sp>
+      <p:sp>
+        <p:nvSpPr>
+          <p:cNvPr id="4" name="Slide Number Placeholder 3"/>
+          <p:cNvSpPr>
+            <a:spLocks noGrp="1"/>
+          </p:cNvSpPr>
+          <p:nvPr>
+            <p:ph type="sldNum" sz="quarter" idx="10"/>
+          </p:nvPr>
+        </p:nvSpPr>
+        <p:spPr/>
+        <p:txBody>
+          <a:bodyPr/>
+          <a:lstStyle/>
+          <a:p>
+            <a:fld id="{2A99E7CB-B55B-433F-ACF3-9EACF2CD01B5}" type="slidenum">
+              <a:rPr lang="nl-NL" smtClean="0"/>
+              <a:t>8</a:t>
             </a:fld>
             <a:endParaRPr lang="nl-NL"/>
           </a:p>
@@ -5700,18 +5785,6 @@
               <a:t>Mats De Meyer</a:t>
             </a:r>
           </a:p>
-          <a:p>
-            <a:r>
-              <a:rPr lang="nl-BE" dirty="0"/>
-              <a:t>Dragan Subotic</a:t>
-            </a:r>
-          </a:p>
-          <a:p>
-            <a:r>
-              <a:rPr lang="nl-BE" dirty="0"/>
-              <a:t>Maarten Weyn</a:t>
-            </a:r>
-          </a:p>
         </p:txBody>
       </p:sp>
     </p:spTree>
@@ -6154,7 +6227,7 @@
           <a:p>
             <a:r>
               <a:rPr lang="nl-BE" dirty="0"/>
-              <a:t>Code Flow: Reachable Gateways</a:t>
+              <a:t>Result</a:t>
             </a:r>
           </a:p>
         </p:txBody>
@@ -6361,10 +6434,10 @@
       </p:sp>
       <p:pic>
         <p:nvPicPr>
-          <p:cNvPr id="7" name="Content Placeholder 6">
+          <p:cNvPr id="9" name="Content Placeholder 8">
             <a:extLst>
               <a:ext uri="{FF2B5EF4-FFF2-40B4-BE49-F238E27FC236}">
-                <a16:creationId xmlns:a16="http://schemas.microsoft.com/office/drawing/2014/main" id="{B2C28C02-C63B-46E6-9FEA-850850A5F26E}"/>
+                <a16:creationId xmlns:a16="http://schemas.microsoft.com/office/drawing/2014/main" id="{ED94E7BD-CE85-4EE7-873A-6CC76FB240E3}"/>
               </a:ext>
             </a:extLst>
           </p:cNvPr>
@@ -6375,16 +6448,54 @@
             <p:ph idx="1"/>
           </p:nvPr>
         </p:nvPicPr>
+        <p:blipFill rotWithShape="1">
+          <a:blip r:embed="rId3" cstate="print">
+            <a:extLst>
+              <a:ext uri="{28A0092B-C50C-407E-A947-70E740481C1C}">
+                <a14:useLocalDpi xmlns:a14="http://schemas.microsoft.com/office/drawing/2010/main" val="0"/>
+              </a:ext>
+            </a:extLst>
+          </a:blip>
+          <a:srcRect b="27938"/>
+          <a:stretch/>
+        </p:blipFill>
+        <p:spPr>
+          <a:xfrm>
+            <a:off x="547539" y="1038276"/>
+            <a:ext cx="3777215" cy="4838996"/>
+          </a:xfrm>
+        </p:spPr>
+      </p:pic>
+      <p:pic>
+        <p:nvPicPr>
+          <p:cNvPr id="11" name="Picture 10">
+            <a:extLst>
+              <a:ext uri="{FF2B5EF4-FFF2-40B4-BE49-F238E27FC236}">
+                <a16:creationId xmlns:a16="http://schemas.microsoft.com/office/drawing/2014/main" id="{DD1AE799-166E-40FC-ABD8-53432D12C1DE}"/>
+              </a:ext>
+            </a:extLst>
+          </p:cNvPr>
+          <p:cNvPicPr>
+            <a:picLocks noChangeAspect="1"/>
+          </p:cNvPicPr>
+          <p:nvPr/>
+        </p:nvPicPr>
         <p:blipFill>
-          <a:blip r:embed="rId3"/>
+          <a:blip r:embed="rId4" cstate="print">
+            <a:extLst>
+              <a:ext uri="{28A0092B-C50C-407E-A947-70E740481C1C}">
+                <a14:useLocalDpi xmlns:a14="http://schemas.microsoft.com/office/drawing/2010/main" val="0"/>
+              </a:ext>
+            </a:extLst>
+          </a:blip>
           <a:stretch>
             <a:fillRect/>
           </a:stretch>
         </p:blipFill>
         <p:spPr>
           <a:xfrm>
-            <a:off x="1091644" y="1025022"/>
-            <a:ext cx="6960712" cy="5184105"/>
+            <a:off x="4332741" y="1030636"/>
+            <a:ext cx="4092298" cy="4437112"/>
           </a:xfrm>
           <a:prstGeom prst="rect">
             <a:avLst/>
@@ -6394,7 +6505,7 @@
     </p:spTree>
     <p:extLst>
       <p:ext uri="{BB962C8B-B14F-4D97-AF65-F5344CB8AC3E}">
-        <p14:creationId xmlns:p14="http://schemas.microsoft.com/office/powerpoint/2010/main" val="1168411330"/>
+        <p14:creationId xmlns:p14="http://schemas.microsoft.com/office/powerpoint/2010/main" val="2303784672"/>
       </p:ext>
     </p:extLst>
   </p:cSld>
@@ -6438,7 +6549,7 @@
           <a:p>
             <a:r>
               <a:rPr lang="nl-BE" dirty="0"/>
-              <a:t>Code Flow: No Gateways</a:t>
+              <a:t>Code Flow: Reachable Gateways</a:t>
             </a:r>
           </a:p>
         </p:txBody>
@@ -6645,6 +6756,290 @@
       </p:sp>
       <p:pic>
         <p:nvPicPr>
+          <p:cNvPr id="7" name="Content Placeholder 6">
+            <a:extLst>
+              <a:ext uri="{FF2B5EF4-FFF2-40B4-BE49-F238E27FC236}">
+                <a16:creationId xmlns:a16="http://schemas.microsoft.com/office/drawing/2014/main" id="{B2C28C02-C63B-46E6-9FEA-850850A5F26E}"/>
+              </a:ext>
+            </a:extLst>
+          </p:cNvPr>
+          <p:cNvPicPr>
+            <a:picLocks noGrp="1" noChangeAspect="1"/>
+          </p:cNvPicPr>
+          <p:nvPr>
+            <p:ph idx="1"/>
+          </p:nvPr>
+        </p:nvPicPr>
+        <p:blipFill>
+          <a:blip r:embed="rId3"/>
+          <a:stretch>
+            <a:fillRect/>
+          </a:stretch>
+        </p:blipFill>
+        <p:spPr>
+          <a:xfrm>
+            <a:off x="1091644" y="1025022"/>
+            <a:ext cx="6960712" cy="5184105"/>
+          </a:xfrm>
+          <a:prstGeom prst="rect">
+            <a:avLst/>
+          </a:prstGeom>
+        </p:spPr>
+      </p:pic>
+    </p:spTree>
+    <p:extLst>
+      <p:ext uri="{BB962C8B-B14F-4D97-AF65-F5344CB8AC3E}">
+        <p14:creationId xmlns:p14="http://schemas.microsoft.com/office/powerpoint/2010/main" val="1168411330"/>
+      </p:ext>
+    </p:extLst>
+  </p:cSld>
+  <p:clrMapOvr>
+    <a:masterClrMapping/>
+  </p:clrMapOvr>
+</p:sld>
+</file>
+
+<file path=ppt/slides/slide7.xml><?xml version="1.0" encoding="utf-8"?>
+<p:sld xmlns:a="http://schemas.openxmlformats.org/drawingml/2006/main" xmlns:r="http://schemas.openxmlformats.org/officeDocument/2006/relationships" xmlns:p="http://schemas.openxmlformats.org/presentationml/2006/main">
+  <p:cSld>
+    <p:spTree>
+      <p:nvGrpSpPr>
+        <p:cNvPr id="1" name=""/>
+        <p:cNvGrpSpPr/>
+        <p:nvPr/>
+      </p:nvGrpSpPr>
+      <p:grpSpPr>
+        <a:xfrm>
+          <a:off x="0" y="0"/>
+          <a:ext cx="0" cy="0"/>
+          <a:chOff x="0" y="0"/>
+          <a:chExt cx="0" cy="0"/>
+        </a:xfrm>
+      </p:grpSpPr>
+      <p:sp>
+        <p:nvSpPr>
+          <p:cNvPr id="2" name="Titel 1"/>
+          <p:cNvSpPr>
+            <a:spLocks noGrp="1"/>
+          </p:cNvSpPr>
+          <p:nvPr>
+            <p:ph type="title"/>
+          </p:nvPr>
+        </p:nvSpPr>
+        <p:spPr/>
+        <p:txBody>
+          <a:bodyPr/>
+          <a:lstStyle/>
+          <a:p>
+            <a:r>
+              <a:rPr lang="nl-BE" dirty="0"/>
+              <a:t>Code Flow: No Gateways</a:t>
+            </a:r>
+          </a:p>
+        </p:txBody>
+      </p:sp>
+      <p:sp>
+        <p:nvSpPr>
+          <p:cNvPr id="4" name="Tijdelijke aanduiding voor dianummer 3"/>
+          <p:cNvSpPr>
+            <a:spLocks noGrp="1"/>
+          </p:cNvSpPr>
+          <p:nvPr>
+            <p:ph type="sldNum" sz="quarter" idx="12"/>
+          </p:nvPr>
+        </p:nvSpPr>
+        <p:spPr/>
+        <p:txBody>
+          <a:bodyPr/>
+          <a:lstStyle/>
+          <a:p>
+            <a:fld id="{3B032377-C103-4EFE-98C1-80A6E5A7472A}" type="slidenum">
+              <a:rPr lang="nl-NL" smtClean="0"/>
+              <a:t>7</a:t>
+            </a:fld>
+            <a:endParaRPr lang="nl-NL"/>
+          </a:p>
+        </p:txBody>
+      </p:sp>
+      <p:sp>
+        <p:nvSpPr>
+          <p:cNvPr id="6" name="Tijdelijke aanduiding voor inhoud 2">
+            <a:extLst>
+              <a:ext uri="{FF2B5EF4-FFF2-40B4-BE49-F238E27FC236}">
+                <a16:creationId xmlns:a16="http://schemas.microsoft.com/office/drawing/2014/main" id="{D6280A83-90C8-4F51-8CA6-EAAA9CA2CD18}"/>
+              </a:ext>
+            </a:extLst>
+          </p:cNvPr>
+          <p:cNvSpPr txBox="1">
+            <a:spLocks/>
+          </p:cNvSpPr>
+          <p:nvPr/>
+        </p:nvSpPr>
+        <p:spPr>
+          <a:xfrm>
+            <a:off x="539552" y="1196976"/>
+            <a:ext cx="8064896" cy="4895850"/>
+          </a:xfrm>
+          <a:prstGeom prst="rect">
+            <a:avLst/>
+          </a:prstGeom>
+        </p:spPr>
+        <p:txBody>
+          <a:bodyPr vert="horz" lIns="0" tIns="36000" rIns="0" bIns="36000" rtlCol="0">
+            <a:noAutofit/>
+          </a:bodyPr>
+          <a:lstStyle>
+            <a:lvl1pPr marL="0" indent="0" algn="l" defTabSz="914400" rtl="0" eaLnBrk="1" latinLnBrk="0" hangingPunct="1">
+              <a:spcBef>
+                <a:spcPct val="20000"/>
+              </a:spcBef>
+              <a:buFontTx/>
+              <a:buNone/>
+              <a:defRPr sz="2600" kern="1200">
+                <a:solidFill>
+                  <a:schemeClr val="tx2"/>
+                </a:solidFill>
+                <a:latin typeface="+mn-lt"/>
+                <a:ea typeface="+mn-ea"/>
+                <a:cs typeface="+mn-cs"/>
+              </a:defRPr>
+            </a:lvl1pPr>
+            <a:lvl2pPr marL="216000" indent="-216000" algn="l" defTabSz="914400" rtl="0" eaLnBrk="1" latinLnBrk="0" hangingPunct="1">
+              <a:spcBef>
+                <a:spcPct val="20000"/>
+              </a:spcBef>
+              <a:buSzPct val="85000"/>
+              <a:buFont typeface="Wingdings" panose="05000000000000000000" pitchFamily="2" charset="2"/>
+              <a:buChar char="§"/>
+              <a:defRPr sz="2600" kern="1200">
+                <a:solidFill>
+                  <a:schemeClr val="tx2"/>
+                </a:solidFill>
+                <a:latin typeface="+mn-lt"/>
+                <a:ea typeface="+mn-ea"/>
+                <a:cs typeface="+mn-cs"/>
+              </a:defRPr>
+            </a:lvl2pPr>
+            <a:lvl3pPr marL="576000" indent="-216000" algn="l" defTabSz="914400" rtl="0" eaLnBrk="1" latinLnBrk="0" hangingPunct="1">
+              <a:spcBef>
+                <a:spcPct val="20000"/>
+              </a:spcBef>
+              <a:buSzPct val="85000"/>
+              <a:buFont typeface="Wingdings" panose="05000000000000000000" pitchFamily="2" charset="2"/>
+              <a:buChar char="§"/>
+              <a:defRPr sz="2400" kern="1200">
+                <a:solidFill>
+                  <a:schemeClr val="tx2"/>
+                </a:solidFill>
+                <a:latin typeface="+mn-lt"/>
+                <a:ea typeface="+mn-ea"/>
+                <a:cs typeface="+mn-cs"/>
+              </a:defRPr>
+            </a:lvl3pPr>
+            <a:lvl4pPr marL="936000" indent="-216000" algn="l" defTabSz="914400" rtl="0" eaLnBrk="1" latinLnBrk="0" hangingPunct="1">
+              <a:spcBef>
+                <a:spcPct val="20000"/>
+              </a:spcBef>
+              <a:buSzPct val="85000"/>
+              <a:buFont typeface="Wingdings" panose="05000000000000000000" pitchFamily="2" charset="2"/>
+              <a:buChar char="§"/>
+              <a:defRPr sz="2200" kern="1200">
+                <a:solidFill>
+                  <a:schemeClr val="tx2"/>
+                </a:solidFill>
+                <a:latin typeface="+mn-lt"/>
+                <a:ea typeface="+mn-ea"/>
+                <a:cs typeface="+mn-cs"/>
+              </a:defRPr>
+            </a:lvl4pPr>
+            <a:lvl5pPr marL="1296000" indent="-216000" algn="l" defTabSz="914400" rtl="0" eaLnBrk="1" latinLnBrk="0" hangingPunct="1">
+              <a:spcBef>
+                <a:spcPct val="20000"/>
+              </a:spcBef>
+              <a:buSzPct val="85000"/>
+              <a:buFont typeface="Wingdings" panose="05000000000000000000" pitchFamily="2" charset="2"/>
+              <a:buChar char="§"/>
+              <a:defRPr sz="2000" kern="1200">
+                <a:solidFill>
+                  <a:schemeClr val="tx2"/>
+                </a:solidFill>
+                <a:latin typeface="+mn-lt"/>
+                <a:ea typeface="+mn-ea"/>
+                <a:cs typeface="+mn-cs"/>
+              </a:defRPr>
+            </a:lvl5pPr>
+            <a:lvl6pPr marL="2514600" indent="-228600" algn="l" defTabSz="914400" rtl="0" eaLnBrk="1" latinLnBrk="0" hangingPunct="1">
+              <a:spcBef>
+                <a:spcPct val="20000"/>
+              </a:spcBef>
+              <a:buFont typeface="Arial" panose="020B0604020202020204" pitchFamily="34" charset="0"/>
+              <a:buChar char="•"/>
+              <a:defRPr sz="2000" kern="1200">
+                <a:solidFill>
+                  <a:schemeClr val="tx1"/>
+                </a:solidFill>
+                <a:latin typeface="+mn-lt"/>
+                <a:ea typeface="+mn-ea"/>
+                <a:cs typeface="+mn-cs"/>
+              </a:defRPr>
+            </a:lvl6pPr>
+            <a:lvl7pPr marL="2971800" indent="-228600" algn="l" defTabSz="914400" rtl="0" eaLnBrk="1" latinLnBrk="0" hangingPunct="1">
+              <a:spcBef>
+                <a:spcPct val="20000"/>
+              </a:spcBef>
+              <a:buFont typeface="Arial" panose="020B0604020202020204" pitchFamily="34" charset="0"/>
+              <a:buChar char="•"/>
+              <a:defRPr sz="2000" kern="1200">
+                <a:solidFill>
+                  <a:schemeClr val="tx1"/>
+                </a:solidFill>
+                <a:latin typeface="+mn-lt"/>
+                <a:ea typeface="+mn-ea"/>
+                <a:cs typeface="+mn-cs"/>
+              </a:defRPr>
+            </a:lvl7pPr>
+            <a:lvl8pPr marL="3429000" indent="-228600" algn="l" defTabSz="914400" rtl="0" eaLnBrk="1" latinLnBrk="0" hangingPunct="1">
+              <a:spcBef>
+                <a:spcPct val="20000"/>
+              </a:spcBef>
+              <a:buFont typeface="Arial" panose="020B0604020202020204" pitchFamily="34" charset="0"/>
+              <a:buChar char="•"/>
+              <a:defRPr sz="2000" kern="1200">
+                <a:solidFill>
+                  <a:schemeClr val="tx1"/>
+                </a:solidFill>
+                <a:latin typeface="+mn-lt"/>
+                <a:ea typeface="+mn-ea"/>
+                <a:cs typeface="+mn-cs"/>
+              </a:defRPr>
+            </a:lvl8pPr>
+            <a:lvl9pPr marL="3886200" indent="-228600" algn="l" defTabSz="914400" rtl="0" eaLnBrk="1" latinLnBrk="0" hangingPunct="1">
+              <a:spcBef>
+                <a:spcPct val="20000"/>
+              </a:spcBef>
+              <a:buFont typeface="Arial" panose="020B0604020202020204" pitchFamily="34" charset="0"/>
+              <a:buChar char="•"/>
+              <a:defRPr sz="2000" kern="1200">
+                <a:solidFill>
+                  <a:schemeClr val="tx1"/>
+                </a:solidFill>
+                <a:latin typeface="+mn-lt"/>
+                <a:ea typeface="+mn-ea"/>
+                <a:cs typeface="+mn-cs"/>
+              </a:defRPr>
+            </a:lvl9pPr>
+          </a:lstStyle>
+          <a:p>
+            <a:pPr marL="457200" indent="-457200">
+              <a:buFont typeface="Arial" panose="020B0604020202020204" pitchFamily="34" charset="0"/>
+              <a:buChar char="•"/>
+            </a:pPr>
+            <a:endParaRPr lang="nl-BE" dirty="0"/>
+          </a:p>
+        </p:txBody>
+      </p:sp>
+      <p:pic>
+        <p:nvPicPr>
           <p:cNvPr id="8" name="Content Placeholder 7">
             <a:extLst>
               <a:ext uri="{FF2B5EF4-FFF2-40B4-BE49-F238E27FC236}">
@@ -6688,7 +7083,7 @@
 </p:sld>
 </file>
 
-<file path=ppt/slides/slide7.xml><?xml version="1.0" encoding="utf-8"?>
+<file path=ppt/slides/slide8.xml><?xml version="1.0" encoding="utf-8"?>
 <p:sld xmlns:a="http://schemas.openxmlformats.org/drawingml/2006/main" xmlns:r="http://schemas.openxmlformats.org/officeDocument/2006/relationships" xmlns:p="http://schemas.openxmlformats.org/presentationml/2006/main">
   <p:cSld>
     <p:spTree>
@@ -6800,7 +7195,7 @@
           <a:p>
             <a:fld id="{3B032377-C103-4EFE-98C1-80A6E5A7472A}" type="slidenum">
               <a:rPr lang="nl-NL" smtClean="0"/>
-              <a:t>7</a:t>
+              <a:t>8</a:t>
             </a:fld>
             <a:endParaRPr lang="nl-NL"/>
           </a:p>
@@ -6819,7 +7214,7 @@
 </p:sld>
 </file>
 
-<file path=ppt/slides/slide8.xml><?xml version="1.0" encoding="utf-8"?>
+<file path=ppt/slides/slide9.xml><?xml version="1.0" encoding="utf-8"?>
 <p:sld xmlns:a="http://schemas.openxmlformats.org/drawingml/2006/main" xmlns:r="http://schemas.openxmlformats.org/officeDocument/2006/relationships" xmlns:p="http://schemas.openxmlformats.org/presentationml/2006/main">
   <p:cSld>
     <p:spTree>

</xml_diff>